<commit_message>
03 classification validation & restructure future labs
</commit_message>
<xml_diff>
--- a/Microsoft/Purview/Purview-Retail-Data-Protection-Masterclass/02-Data-Foundation/data-templates/Q1-Sales-Strategy.pptx
+++ b/Microsoft/Purview/Purview-Retail-Data-Protection-Masterclass/02-Data-Foundation/data-templates/Q1-Sales-Strategy.pptx
@@ -131,7 +131,7 @@
           <p:cNvPr id="2" name="Title 1">
             <a:extLst>
               <a:ext uri="{FF2B5EF4-FFF2-40B4-BE49-F238E27FC236}">
-                <a16:creationId xmlns:a16="http://schemas.microsoft.com/office/drawing/2014/main" id="{7FEF6D5A-1245-3A23-F6EC-7AF60B034A1E}"/>
+                <a16:creationId xmlns:a16="http://schemas.microsoft.com/office/drawing/2014/main" id="{DB3E2009-431C-DC07-5CA8-8BBAB9A1226B}"/>
               </a:ext>
             </a:extLst>
           </p:cNvPr>
@@ -168,7 +168,7 @@
           <p:cNvPr id="3" name="Subtitle 2">
             <a:extLst>
               <a:ext uri="{FF2B5EF4-FFF2-40B4-BE49-F238E27FC236}">
-                <a16:creationId xmlns:a16="http://schemas.microsoft.com/office/drawing/2014/main" id="{5C93D97B-1A22-764C-2A80-CF9FBD72476F}"/>
+                <a16:creationId xmlns:a16="http://schemas.microsoft.com/office/drawing/2014/main" id="{428836A6-754B-A29B-A3BD-6234F5C438C9}"/>
               </a:ext>
             </a:extLst>
           </p:cNvPr>
@@ -238,7 +238,7 @@
           <p:cNvPr id="4" name="Date Placeholder 3">
             <a:extLst>
               <a:ext uri="{FF2B5EF4-FFF2-40B4-BE49-F238E27FC236}">
-                <a16:creationId xmlns:a16="http://schemas.microsoft.com/office/drawing/2014/main" id="{EC22A2AF-C764-7054-BEFB-26D744FAC0D6}"/>
+                <a16:creationId xmlns:a16="http://schemas.microsoft.com/office/drawing/2014/main" id="{CBB5112D-120D-37C8-9EA3-E1026EEEAA2E}"/>
               </a:ext>
             </a:extLst>
           </p:cNvPr>
@@ -254,9 +254,9 @@
           <a:bodyPr/>
           <a:lstStyle/>
           <a:p>
-            <a:fld id="{775AB4AB-2B8E-4290-ADC8-49AA9E11DE56}" type="datetimeFigureOut">
+            <a:fld id="{451E388C-5248-41E8-9BD1-63C7D15982ED}" type="datetimeFigureOut">
               <a:rPr lang="en-US" smtClean="0"/>
-              <a:t>12/30/2025</a:t>
+              <a:t>12/31/2025</a:t>
             </a:fld>
             <a:endParaRPr lang="en-US"/>
           </a:p>
@@ -267,7 +267,7 @@
           <p:cNvPr id="5" name="Footer Placeholder 4">
             <a:extLst>
               <a:ext uri="{FF2B5EF4-FFF2-40B4-BE49-F238E27FC236}">
-                <a16:creationId xmlns:a16="http://schemas.microsoft.com/office/drawing/2014/main" id="{652A0EB4-DE15-277B-768C-E1FA1D2CC441}"/>
+                <a16:creationId xmlns:a16="http://schemas.microsoft.com/office/drawing/2014/main" id="{B87456C4-06FA-A571-3723-EF85D0DB8DC6}"/>
               </a:ext>
             </a:extLst>
           </p:cNvPr>
@@ -292,7 +292,7 @@
           <p:cNvPr id="6" name="Slide Number Placeholder 5">
             <a:extLst>
               <a:ext uri="{FF2B5EF4-FFF2-40B4-BE49-F238E27FC236}">
-                <a16:creationId xmlns:a16="http://schemas.microsoft.com/office/drawing/2014/main" id="{28A2E8CA-1F9A-543F-295E-086B77F48160}"/>
+                <a16:creationId xmlns:a16="http://schemas.microsoft.com/office/drawing/2014/main" id="{1C251A4D-BC13-8E44-D0B5-8062D49F005B}"/>
               </a:ext>
             </a:extLst>
           </p:cNvPr>
@@ -308,7 +308,7 @@
           <a:bodyPr/>
           <a:lstStyle/>
           <a:p>
-            <a:fld id="{BAC9DC5F-1903-4277-8994-DA330A0CAB68}" type="slidenum">
+            <a:fld id="{BA2492E7-AE07-4FE0-B6B8-75C0494EB323}" type="slidenum">
               <a:rPr lang="en-US" smtClean="0"/>
               <a:t>‹#›</a:t>
             </a:fld>
@@ -319,7 +319,7 @@
     </p:spTree>
     <p:extLst>
       <p:ext uri="{BB962C8B-B14F-4D97-AF65-F5344CB8AC3E}">
-        <p14:creationId xmlns:p14="http://schemas.microsoft.com/office/powerpoint/2010/main" val="3027907020"/>
+        <p14:creationId xmlns:p14="http://schemas.microsoft.com/office/powerpoint/2010/main" val="845407161"/>
       </p:ext>
     </p:extLst>
   </p:cSld>
@@ -351,7 +351,7 @@
           <p:cNvPr id="2" name="Title 1">
             <a:extLst>
               <a:ext uri="{FF2B5EF4-FFF2-40B4-BE49-F238E27FC236}">
-                <a16:creationId xmlns:a16="http://schemas.microsoft.com/office/drawing/2014/main" id="{0BC7945C-139B-E61A-2407-4EFF197AAADC}"/>
+                <a16:creationId xmlns:a16="http://schemas.microsoft.com/office/drawing/2014/main" id="{5289CC27-2783-8423-C7C3-D3677789A9DA}"/>
               </a:ext>
             </a:extLst>
           </p:cNvPr>
@@ -379,7 +379,7 @@
           <p:cNvPr id="3" name="Vertical Text Placeholder 2">
             <a:extLst>
               <a:ext uri="{FF2B5EF4-FFF2-40B4-BE49-F238E27FC236}">
-                <a16:creationId xmlns:a16="http://schemas.microsoft.com/office/drawing/2014/main" id="{AF85298C-0931-7BDB-E6E1-AD3BFA33F771}"/>
+                <a16:creationId xmlns:a16="http://schemas.microsoft.com/office/drawing/2014/main" id="{D8764147-B7D0-A75B-36B8-822A4181F61E}"/>
               </a:ext>
             </a:extLst>
           </p:cNvPr>
@@ -436,7 +436,7 @@
           <p:cNvPr id="4" name="Date Placeholder 3">
             <a:extLst>
               <a:ext uri="{FF2B5EF4-FFF2-40B4-BE49-F238E27FC236}">
-                <a16:creationId xmlns:a16="http://schemas.microsoft.com/office/drawing/2014/main" id="{63A60B85-0EEC-ABE1-79A9-716641D7DB39}"/>
+                <a16:creationId xmlns:a16="http://schemas.microsoft.com/office/drawing/2014/main" id="{DE9281D9-4781-DEA2-C2DD-20CB32D16A61}"/>
               </a:ext>
             </a:extLst>
           </p:cNvPr>
@@ -452,9 +452,9 @@
           <a:bodyPr/>
           <a:lstStyle/>
           <a:p>
-            <a:fld id="{775AB4AB-2B8E-4290-ADC8-49AA9E11DE56}" type="datetimeFigureOut">
+            <a:fld id="{451E388C-5248-41E8-9BD1-63C7D15982ED}" type="datetimeFigureOut">
               <a:rPr lang="en-US" smtClean="0"/>
-              <a:t>12/30/2025</a:t>
+              <a:t>12/31/2025</a:t>
             </a:fld>
             <a:endParaRPr lang="en-US"/>
           </a:p>
@@ -465,7 +465,7 @@
           <p:cNvPr id="5" name="Footer Placeholder 4">
             <a:extLst>
               <a:ext uri="{FF2B5EF4-FFF2-40B4-BE49-F238E27FC236}">
-                <a16:creationId xmlns:a16="http://schemas.microsoft.com/office/drawing/2014/main" id="{6FDF380C-39F2-A238-CD4F-E241B4C4A210}"/>
+                <a16:creationId xmlns:a16="http://schemas.microsoft.com/office/drawing/2014/main" id="{9FD5BE26-7A86-3C5B-1EF9-BB82DB710A10}"/>
               </a:ext>
             </a:extLst>
           </p:cNvPr>
@@ -490,7 +490,7 @@
           <p:cNvPr id="6" name="Slide Number Placeholder 5">
             <a:extLst>
               <a:ext uri="{FF2B5EF4-FFF2-40B4-BE49-F238E27FC236}">
-                <a16:creationId xmlns:a16="http://schemas.microsoft.com/office/drawing/2014/main" id="{BACFDF97-4C3D-5489-E5EE-74FE5E74A6DD}"/>
+                <a16:creationId xmlns:a16="http://schemas.microsoft.com/office/drawing/2014/main" id="{70151C3B-5EB3-BA63-1CDB-7B4F90B8FD50}"/>
               </a:ext>
             </a:extLst>
           </p:cNvPr>
@@ -506,7 +506,7 @@
           <a:bodyPr/>
           <a:lstStyle/>
           <a:p>
-            <a:fld id="{BAC9DC5F-1903-4277-8994-DA330A0CAB68}" type="slidenum">
+            <a:fld id="{BA2492E7-AE07-4FE0-B6B8-75C0494EB323}" type="slidenum">
               <a:rPr lang="en-US" smtClean="0"/>
               <a:t>‹#›</a:t>
             </a:fld>
@@ -517,7 +517,7 @@
     </p:spTree>
     <p:extLst>
       <p:ext uri="{BB962C8B-B14F-4D97-AF65-F5344CB8AC3E}">
-        <p14:creationId xmlns:p14="http://schemas.microsoft.com/office/powerpoint/2010/main" val="4158757017"/>
+        <p14:creationId xmlns:p14="http://schemas.microsoft.com/office/powerpoint/2010/main" val="1559349484"/>
       </p:ext>
     </p:extLst>
   </p:cSld>
@@ -549,7 +549,7 @@
           <p:cNvPr id="2" name="Vertical Title 1">
             <a:extLst>
               <a:ext uri="{FF2B5EF4-FFF2-40B4-BE49-F238E27FC236}">
-                <a16:creationId xmlns:a16="http://schemas.microsoft.com/office/drawing/2014/main" id="{EEF2F76B-F1DE-3BCE-2C21-78AB5BDBC91A}"/>
+                <a16:creationId xmlns:a16="http://schemas.microsoft.com/office/drawing/2014/main" id="{3B5F8C61-6E18-8529-4ACB-30A83CF0E0A4}"/>
               </a:ext>
             </a:extLst>
           </p:cNvPr>
@@ -582,7 +582,7 @@
           <p:cNvPr id="3" name="Vertical Text Placeholder 2">
             <a:extLst>
               <a:ext uri="{FF2B5EF4-FFF2-40B4-BE49-F238E27FC236}">
-                <a16:creationId xmlns:a16="http://schemas.microsoft.com/office/drawing/2014/main" id="{FC51CE05-2021-D6AB-2E7D-064E672F2CFF}"/>
+                <a16:creationId xmlns:a16="http://schemas.microsoft.com/office/drawing/2014/main" id="{0B2236A0-1C49-61B7-1CCB-2FA0762767B2}"/>
               </a:ext>
             </a:extLst>
           </p:cNvPr>
@@ -644,7 +644,7 @@
           <p:cNvPr id="4" name="Date Placeholder 3">
             <a:extLst>
               <a:ext uri="{FF2B5EF4-FFF2-40B4-BE49-F238E27FC236}">
-                <a16:creationId xmlns:a16="http://schemas.microsoft.com/office/drawing/2014/main" id="{4D54027C-D086-9327-695A-92B0C3A6FCFC}"/>
+                <a16:creationId xmlns:a16="http://schemas.microsoft.com/office/drawing/2014/main" id="{A43DB01A-0740-C265-8505-8D515E2A9C95}"/>
               </a:ext>
             </a:extLst>
           </p:cNvPr>
@@ -660,9 +660,9 @@
           <a:bodyPr/>
           <a:lstStyle/>
           <a:p>
-            <a:fld id="{775AB4AB-2B8E-4290-ADC8-49AA9E11DE56}" type="datetimeFigureOut">
+            <a:fld id="{451E388C-5248-41E8-9BD1-63C7D15982ED}" type="datetimeFigureOut">
               <a:rPr lang="en-US" smtClean="0"/>
-              <a:t>12/30/2025</a:t>
+              <a:t>12/31/2025</a:t>
             </a:fld>
             <a:endParaRPr lang="en-US"/>
           </a:p>
@@ -673,7 +673,7 @@
           <p:cNvPr id="5" name="Footer Placeholder 4">
             <a:extLst>
               <a:ext uri="{FF2B5EF4-FFF2-40B4-BE49-F238E27FC236}">
-                <a16:creationId xmlns:a16="http://schemas.microsoft.com/office/drawing/2014/main" id="{D1CF0540-8B9B-0118-0943-380643F0319D}"/>
+                <a16:creationId xmlns:a16="http://schemas.microsoft.com/office/drawing/2014/main" id="{65D18B87-A610-7CAD-BF5C-64CC3F97A46B}"/>
               </a:ext>
             </a:extLst>
           </p:cNvPr>
@@ -698,7 +698,7 @@
           <p:cNvPr id="6" name="Slide Number Placeholder 5">
             <a:extLst>
               <a:ext uri="{FF2B5EF4-FFF2-40B4-BE49-F238E27FC236}">
-                <a16:creationId xmlns:a16="http://schemas.microsoft.com/office/drawing/2014/main" id="{D4B2C98D-39AD-5B94-4A3D-74BA196E82D3}"/>
+                <a16:creationId xmlns:a16="http://schemas.microsoft.com/office/drawing/2014/main" id="{640B6682-2C9F-9360-BF2A-17972364BD1D}"/>
               </a:ext>
             </a:extLst>
           </p:cNvPr>
@@ -714,7 +714,7 @@
           <a:bodyPr/>
           <a:lstStyle/>
           <a:p>
-            <a:fld id="{BAC9DC5F-1903-4277-8994-DA330A0CAB68}" type="slidenum">
+            <a:fld id="{BA2492E7-AE07-4FE0-B6B8-75C0494EB323}" type="slidenum">
               <a:rPr lang="en-US" smtClean="0"/>
               <a:t>‹#›</a:t>
             </a:fld>
@@ -725,7 +725,7 @@
     </p:spTree>
     <p:extLst>
       <p:ext uri="{BB962C8B-B14F-4D97-AF65-F5344CB8AC3E}">
-        <p14:creationId xmlns:p14="http://schemas.microsoft.com/office/powerpoint/2010/main" val="3411669311"/>
+        <p14:creationId xmlns:p14="http://schemas.microsoft.com/office/powerpoint/2010/main" val="3745876196"/>
       </p:ext>
     </p:extLst>
   </p:cSld>
@@ -757,7 +757,7 @@
           <p:cNvPr id="2" name="Title 1">
             <a:extLst>
               <a:ext uri="{FF2B5EF4-FFF2-40B4-BE49-F238E27FC236}">
-                <a16:creationId xmlns:a16="http://schemas.microsoft.com/office/drawing/2014/main" id="{605ED41C-749B-AFE5-521F-1F93EA280F5F}"/>
+                <a16:creationId xmlns:a16="http://schemas.microsoft.com/office/drawing/2014/main" id="{1EB93A78-34BC-873D-B0F7-1EACE31E1921}"/>
               </a:ext>
             </a:extLst>
           </p:cNvPr>
@@ -785,7 +785,7 @@
           <p:cNvPr id="3" name="Text Placeholder 2">
             <a:extLst>
               <a:ext uri="{FF2B5EF4-FFF2-40B4-BE49-F238E27FC236}">
-                <a16:creationId xmlns:a16="http://schemas.microsoft.com/office/drawing/2014/main" id="{2A694D50-61DB-66F3-1727-A36580FEC99E}"/>
+                <a16:creationId xmlns:a16="http://schemas.microsoft.com/office/drawing/2014/main" id="{AEF440AD-2E2C-F3E4-12AD-B99FFD807AA3}"/>
               </a:ext>
             </a:extLst>
           </p:cNvPr>
@@ -842,7 +842,7 @@
           <p:cNvPr id="4" name="Date Placeholder 3">
             <a:extLst>
               <a:ext uri="{FF2B5EF4-FFF2-40B4-BE49-F238E27FC236}">
-                <a16:creationId xmlns:a16="http://schemas.microsoft.com/office/drawing/2014/main" id="{E6643261-5725-B510-45EB-8D8906B062D6}"/>
+                <a16:creationId xmlns:a16="http://schemas.microsoft.com/office/drawing/2014/main" id="{94515F07-9ABA-588F-B690-0C8E748A3A98}"/>
               </a:ext>
             </a:extLst>
           </p:cNvPr>
@@ -858,9 +858,9 @@
           <a:bodyPr/>
           <a:lstStyle/>
           <a:p>
-            <a:fld id="{775AB4AB-2B8E-4290-ADC8-49AA9E11DE56}" type="datetimeFigureOut">
+            <a:fld id="{451E388C-5248-41E8-9BD1-63C7D15982ED}" type="datetimeFigureOut">
               <a:rPr lang="en-US" smtClean="0"/>
-              <a:t>12/30/2025</a:t>
+              <a:t>12/31/2025</a:t>
             </a:fld>
             <a:endParaRPr lang="en-US"/>
           </a:p>
@@ -871,7 +871,7 @@
           <p:cNvPr id="5" name="Footer Placeholder 4">
             <a:extLst>
               <a:ext uri="{FF2B5EF4-FFF2-40B4-BE49-F238E27FC236}">
-                <a16:creationId xmlns:a16="http://schemas.microsoft.com/office/drawing/2014/main" id="{3F7398E7-C152-8B09-6F0E-359615D38EA8}"/>
+                <a16:creationId xmlns:a16="http://schemas.microsoft.com/office/drawing/2014/main" id="{3C31B38B-EAB0-A6F1-3EB1-78FD25BF94B7}"/>
               </a:ext>
             </a:extLst>
           </p:cNvPr>
@@ -896,7 +896,7 @@
           <p:cNvPr id="6" name="Slide Number Placeholder 5">
             <a:extLst>
               <a:ext uri="{FF2B5EF4-FFF2-40B4-BE49-F238E27FC236}">
-                <a16:creationId xmlns:a16="http://schemas.microsoft.com/office/drawing/2014/main" id="{64AD66FC-160A-F0FA-25A8-8FF575F7EB50}"/>
+                <a16:creationId xmlns:a16="http://schemas.microsoft.com/office/drawing/2014/main" id="{E76F683D-560A-D347-648E-8C5C75540773}"/>
               </a:ext>
             </a:extLst>
           </p:cNvPr>
@@ -912,7 +912,7 @@
           <a:bodyPr/>
           <a:lstStyle/>
           <a:p>
-            <a:fld id="{BAC9DC5F-1903-4277-8994-DA330A0CAB68}" type="slidenum">
+            <a:fld id="{BA2492E7-AE07-4FE0-B6B8-75C0494EB323}" type="slidenum">
               <a:rPr lang="en-US" smtClean="0"/>
               <a:t>‹#›</a:t>
             </a:fld>
@@ -923,7 +923,7 @@
     </p:spTree>
     <p:extLst>
       <p:ext uri="{BB962C8B-B14F-4D97-AF65-F5344CB8AC3E}">
-        <p14:creationId xmlns:p14="http://schemas.microsoft.com/office/powerpoint/2010/main" val="3007222721"/>
+        <p14:creationId xmlns:p14="http://schemas.microsoft.com/office/powerpoint/2010/main" val="1634704604"/>
       </p:ext>
     </p:extLst>
   </p:cSld>
@@ -955,7 +955,7 @@
           <p:cNvPr id="2" name="Title 1">
             <a:extLst>
               <a:ext uri="{FF2B5EF4-FFF2-40B4-BE49-F238E27FC236}">
-                <a16:creationId xmlns:a16="http://schemas.microsoft.com/office/drawing/2014/main" id="{49FFF93E-2187-55F2-5EB8-0489EBA1B5F3}"/>
+                <a16:creationId xmlns:a16="http://schemas.microsoft.com/office/drawing/2014/main" id="{92EEF76C-2FFF-5F5D-A462-8F4781D67EDA}"/>
               </a:ext>
             </a:extLst>
           </p:cNvPr>
@@ -983,7 +983,7 @@
           <p:cNvPr id="3" name="Content Placeholder 2">
             <a:extLst>
               <a:ext uri="{FF2B5EF4-FFF2-40B4-BE49-F238E27FC236}">
-                <a16:creationId xmlns:a16="http://schemas.microsoft.com/office/drawing/2014/main" id="{10C2297C-E30F-0190-B29A-FEDBFE2C672B}"/>
+                <a16:creationId xmlns:a16="http://schemas.microsoft.com/office/drawing/2014/main" id="{F1A4EC5B-062C-5510-CFEF-CC0F215A64BF}"/>
               </a:ext>
             </a:extLst>
           </p:cNvPr>
@@ -1040,7 +1040,7 @@
           <p:cNvPr id="4" name="Date Placeholder 3">
             <a:extLst>
               <a:ext uri="{FF2B5EF4-FFF2-40B4-BE49-F238E27FC236}">
-                <a16:creationId xmlns:a16="http://schemas.microsoft.com/office/drawing/2014/main" id="{C26F242B-AC51-8130-495A-AF809755157A}"/>
+                <a16:creationId xmlns:a16="http://schemas.microsoft.com/office/drawing/2014/main" id="{88F2F8A0-778B-F456-D83A-2577AD907DA7}"/>
               </a:ext>
             </a:extLst>
           </p:cNvPr>
@@ -1056,9 +1056,9 @@
           <a:bodyPr/>
           <a:lstStyle/>
           <a:p>
-            <a:fld id="{775AB4AB-2B8E-4290-ADC8-49AA9E11DE56}" type="datetimeFigureOut">
+            <a:fld id="{451E388C-5248-41E8-9BD1-63C7D15982ED}" type="datetimeFigureOut">
               <a:rPr lang="en-US" smtClean="0"/>
-              <a:t>12/30/2025</a:t>
+              <a:t>12/31/2025</a:t>
             </a:fld>
             <a:endParaRPr lang="en-US"/>
           </a:p>
@@ -1069,7 +1069,7 @@
           <p:cNvPr id="5" name="Footer Placeholder 4">
             <a:extLst>
               <a:ext uri="{FF2B5EF4-FFF2-40B4-BE49-F238E27FC236}">
-                <a16:creationId xmlns:a16="http://schemas.microsoft.com/office/drawing/2014/main" id="{F11B26F8-6C47-6195-FC72-6613E15FBD7B}"/>
+                <a16:creationId xmlns:a16="http://schemas.microsoft.com/office/drawing/2014/main" id="{E5E0077E-C841-867C-6A8F-8EE120EA7C16}"/>
               </a:ext>
             </a:extLst>
           </p:cNvPr>
@@ -1094,7 +1094,7 @@
           <p:cNvPr id="6" name="Slide Number Placeholder 5">
             <a:extLst>
               <a:ext uri="{FF2B5EF4-FFF2-40B4-BE49-F238E27FC236}">
-                <a16:creationId xmlns:a16="http://schemas.microsoft.com/office/drawing/2014/main" id="{AD39573E-8E3A-3E84-709E-761F0716C487}"/>
+                <a16:creationId xmlns:a16="http://schemas.microsoft.com/office/drawing/2014/main" id="{416507EA-6A58-DFEA-5B58-D7FFACB09C63}"/>
               </a:ext>
             </a:extLst>
           </p:cNvPr>
@@ -1110,7 +1110,7 @@
           <a:bodyPr/>
           <a:lstStyle/>
           <a:p>
-            <a:fld id="{BAC9DC5F-1903-4277-8994-DA330A0CAB68}" type="slidenum">
+            <a:fld id="{BA2492E7-AE07-4FE0-B6B8-75C0494EB323}" type="slidenum">
               <a:rPr lang="en-US" smtClean="0"/>
               <a:t>‹#›</a:t>
             </a:fld>
@@ -1121,7 +1121,7 @@
     </p:spTree>
     <p:extLst>
       <p:ext uri="{BB962C8B-B14F-4D97-AF65-F5344CB8AC3E}">
-        <p14:creationId xmlns:p14="http://schemas.microsoft.com/office/powerpoint/2010/main" val="730708270"/>
+        <p14:creationId xmlns:p14="http://schemas.microsoft.com/office/powerpoint/2010/main" val="3233521430"/>
       </p:ext>
     </p:extLst>
   </p:cSld>
@@ -1153,7 +1153,7 @@
           <p:cNvPr id="2" name="Title 1">
             <a:extLst>
               <a:ext uri="{FF2B5EF4-FFF2-40B4-BE49-F238E27FC236}">
-                <a16:creationId xmlns:a16="http://schemas.microsoft.com/office/drawing/2014/main" id="{97B8606F-D9FE-A755-D1F1-AFAF4ABE697F}"/>
+                <a16:creationId xmlns:a16="http://schemas.microsoft.com/office/drawing/2014/main" id="{ABB60B8D-CAE7-66B6-4A43-2322AA4E423C}"/>
               </a:ext>
             </a:extLst>
           </p:cNvPr>
@@ -1190,7 +1190,7 @@
           <p:cNvPr id="3" name="Text Placeholder 2">
             <a:extLst>
               <a:ext uri="{FF2B5EF4-FFF2-40B4-BE49-F238E27FC236}">
-                <a16:creationId xmlns:a16="http://schemas.microsoft.com/office/drawing/2014/main" id="{9C0D5AD3-370A-429D-0D2B-F7686BF7B740}"/>
+                <a16:creationId xmlns:a16="http://schemas.microsoft.com/office/drawing/2014/main" id="{B8813245-8570-CB0F-CE2B-4BA78BDF4859}"/>
               </a:ext>
             </a:extLst>
           </p:cNvPr>
@@ -1315,7 +1315,7 @@
           <p:cNvPr id="4" name="Date Placeholder 3">
             <a:extLst>
               <a:ext uri="{FF2B5EF4-FFF2-40B4-BE49-F238E27FC236}">
-                <a16:creationId xmlns:a16="http://schemas.microsoft.com/office/drawing/2014/main" id="{67E694E1-7424-1C24-7505-695B61298EE7}"/>
+                <a16:creationId xmlns:a16="http://schemas.microsoft.com/office/drawing/2014/main" id="{2360DC6B-0DE9-A73F-147C-ABDC262705C3}"/>
               </a:ext>
             </a:extLst>
           </p:cNvPr>
@@ -1331,9 +1331,9 @@
           <a:bodyPr/>
           <a:lstStyle/>
           <a:p>
-            <a:fld id="{775AB4AB-2B8E-4290-ADC8-49AA9E11DE56}" type="datetimeFigureOut">
+            <a:fld id="{451E388C-5248-41E8-9BD1-63C7D15982ED}" type="datetimeFigureOut">
               <a:rPr lang="en-US" smtClean="0"/>
-              <a:t>12/30/2025</a:t>
+              <a:t>12/31/2025</a:t>
             </a:fld>
             <a:endParaRPr lang="en-US"/>
           </a:p>
@@ -1344,7 +1344,7 @@
           <p:cNvPr id="5" name="Footer Placeholder 4">
             <a:extLst>
               <a:ext uri="{FF2B5EF4-FFF2-40B4-BE49-F238E27FC236}">
-                <a16:creationId xmlns:a16="http://schemas.microsoft.com/office/drawing/2014/main" id="{DB857899-EDC4-4A48-8680-6928FB9E7428}"/>
+                <a16:creationId xmlns:a16="http://schemas.microsoft.com/office/drawing/2014/main" id="{BE844169-F9A7-FB69-F16E-9E995F5C4E0C}"/>
               </a:ext>
             </a:extLst>
           </p:cNvPr>
@@ -1369,7 +1369,7 @@
           <p:cNvPr id="6" name="Slide Number Placeholder 5">
             <a:extLst>
               <a:ext uri="{FF2B5EF4-FFF2-40B4-BE49-F238E27FC236}">
-                <a16:creationId xmlns:a16="http://schemas.microsoft.com/office/drawing/2014/main" id="{A25040FC-1813-82B9-C606-102534660F46}"/>
+                <a16:creationId xmlns:a16="http://schemas.microsoft.com/office/drawing/2014/main" id="{EFAF506B-1EA8-0CFC-A01E-C2EA61E61C27}"/>
               </a:ext>
             </a:extLst>
           </p:cNvPr>
@@ -1385,7 +1385,7 @@
           <a:bodyPr/>
           <a:lstStyle/>
           <a:p>
-            <a:fld id="{BAC9DC5F-1903-4277-8994-DA330A0CAB68}" type="slidenum">
+            <a:fld id="{BA2492E7-AE07-4FE0-B6B8-75C0494EB323}" type="slidenum">
               <a:rPr lang="en-US" smtClean="0"/>
               <a:t>‹#›</a:t>
             </a:fld>
@@ -1396,7 +1396,7 @@
     </p:spTree>
     <p:extLst>
       <p:ext uri="{BB962C8B-B14F-4D97-AF65-F5344CB8AC3E}">
-        <p14:creationId xmlns:p14="http://schemas.microsoft.com/office/powerpoint/2010/main" val="3873174197"/>
+        <p14:creationId xmlns:p14="http://schemas.microsoft.com/office/powerpoint/2010/main" val="2550063157"/>
       </p:ext>
     </p:extLst>
   </p:cSld>
@@ -1428,7 +1428,7 @@
           <p:cNvPr id="2" name="Title 1">
             <a:extLst>
               <a:ext uri="{FF2B5EF4-FFF2-40B4-BE49-F238E27FC236}">
-                <a16:creationId xmlns:a16="http://schemas.microsoft.com/office/drawing/2014/main" id="{1618F3DE-AB1C-E6D5-E0F2-8C35C91A3746}"/>
+                <a16:creationId xmlns:a16="http://schemas.microsoft.com/office/drawing/2014/main" id="{2A753933-CF07-BA33-D556-EBD68AD020FC}"/>
               </a:ext>
             </a:extLst>
           </p:cNvPr>
@@ -1456,7 +1456,7 @@
           <p:cNvPr id="3" name="Content Placeholder 2">
             <a:extLst>
               <a:ext uri="{FF2B5EF4-FFF2-40B4-BE49-F238E27FC236}">
-                <a16:creationId xmlns:a16="http://schemas.microsoft.com/office/drawing/2014/main" id="{CBB66492-579F-C312-7797-D8CE052CF530}"/>
+                <a16:creationId xmlns:a16="http://schemas.microsoft.com/office/drawing/2014/main" id="{5C5126FB-D10D-23B3-F34B-2AE95DCC746F}"/>
               </a:ext>
             </a:extLst>
           </p:cNvPr>
@@ -1518,7 +1518,7 @@
           <p:cNvPr id="4" name="Content Placeholder 3">
             <a:extLst>
               <a:ext uri="{FF2B5EF4-FFF2-40B4-BE49-F238E27FC236}">
-                <a16:creationId xmlns:a16="http://schemas.microsoft.com/office/drawing/2014/main" id="{1BF08C70-1EA5-D15D-CEFB-D884DFBCA840}"/>
+                <a16:creationId xmlns:a16="http://schemas.microsoft.com/office/drawing/2014/main" id="{540A6E91-208E-7DFD-40B3-8299F31FFAB6}"/>
               </a:ext>
             </a:extLst>
           </p:cNvPr>
@@ -1580,7 +1580,7 @@
           <p:cNvPr id="5" name="Date Placeholder 4">
             <a:extLst>
               <a:ext uri="{FF2B5EF4-FFF2-40B4-BE49-F238E27FC236}">
-                <a16:creationId xmlns:a16="http://schemas.microsoft.com/office/drawing/2014/main" id="{F8D3EA66-BDA2-5EAF-451D-763EDD2F19E3}"/>
+                <a16:creationId xmlns:a16="http://schemas.microsoft.com/office/drawing/2014/main" id="{E280606F-EB31-C449-92BE-331682EAF834}"/>
               </a:ext>
             </a:extLst>
           </p:cNvPr>
@@ -1596,9 +1596,9 @@
           <a:bodyPr/>
           <a:lstStyle/>
           <a:p>
-            <a:fld id="{775AB4AB-2B8E-4290-ADC8-49AA9E11DE56}" type="datetimeFigureOut">
+            <a:fld id="{451E388C-5248-41E8-9BD1-63C7D15982ED}" type="datetimeFigureOut">
               <a:rPr lang="en-US" smtClean="0"/>
-              <a:t>12/30/2025</a:t>
+              <a:t>12/31/2025</a:t>
             </a:fld>
             <a:endParaRPr lang="en-US"/>
           </a:p>
@@ -1609,7 +1609,7 @@
           <p:cNvPr id="6" name="Footer Placeholder 5">
             <a:extLst>
               <a:ext uri="{FF2B5EF4-FFF2-40B4-BE49-F238E27FC236}">
-                <a16:creationId xmlns:a16="http://schemas.microsoft.com/office/drawing/2014/main" id="{46E14A36-A56A-AA97-B2C0-73C0CA482DF8}"/>
+                <a16:creationId xmlns:a16="http://schemas.microsoft.com/office/drawing/2014/main" id="{B62493C8-E741-64C6-136E-EB6A4F1266FA}"/>
               </a:ext>
             </a:extLst>
           </p:cNvPr>
@@ -1634,7 +1634,7 @@
           <p:cNvPr id="7" name="Slide Number Placeholder 6">
             <a:extLst>
               <a:ext uri="{FF2B5EF4-FFF2-40B4-BE49-F238E27FC236}">
-                <a16:creationId xmlns:a16="http://schemas.microsoft.com/office/drawing/2014/main" id="{3EBEBF3C-CED3-4A27-39D1-702A4C2FF785}"/>
+                <a16:creationId xmlns:a16="http://schemas.microsoft.com/office/drawing/2014/main" id="{D52A0DA1-F0A7-ABB0-D839-1F8B4B0BC94B}"/>
               </a:ext>
             </a:extLst>
           </p:cNvPr>
@@ -1650,7 +1650,7 @@
           <a:bodyPr/>
           <a:lstStyle/>
           <a:p>
-            <a:fld id="{BAC9DC5F-1903-4277-8994-DA330A0CAB68}" type="slidenum">
+            <a:fld id="{BA2492E7-AE07-4FE0-B6B8-75C0494EB323}" type="slidenum">
               <a:rPr lang="en-US" smtClean="0"/>
               <a:t>‹#›</a:t>
             </a:fld>
@@ -1661,7 +1661,7 @@
     </p:spTree>
     <p:extLst>
       <p:ext uri="{BB962C8B-B14F-4D97-AF65-F5344CB8AC3E}">
-        <p14:creationId xmlns:p14="http://schemas.microsoft.com/office/powerpoint/2010/main" val="444984666"/>
+        <p14:creationId xmlns:p14="http://schemas.microsoft.com/office/powerpoint/2010/main" val="1172002880"/>
       </p:ext>
     </p:extLst>
   </p:cSld>
@@ -1693,7 +1693,7 @@
           <p:cNvPr id="2" name="Title 1">
             <a:extLst>
               <a:ext uri="{FF2B5EF4-FFF2-40B4-BE49-F238E27FC236}">
-                <a16:creationId xmlns:a16="http://schemas.microsoft.com/office/drawing/2014/main" id="{F25C395A-8229-F296-DDBD-5099CC83427E}"/>
+                <a16:creationId xmlns:a16="http://schemas.microsoft.com/office/drawing/2014/main" id="{CFC9D8F4-582D-9640-D217-74673EA2CF46}"/>
               </a:ext>
             </a:extLst>
           </p:cNvPr>
@@ -1726,7 +1726,7 @@
           <p:cNvPr id="3" name="Text Placeholder 2">
             <a:extLst>
               <a:ext uri="{FF2B5EF4-FFF2-40B4-BE49-F238E27FC236}">
-                <a16:creationId xmlns:a16="http://schemas.microsoft.com/office/drawing/2014/main" id="{EE0CA8F5-5A39-7C47-ADE8-9948469D4C24}"/>
+                <a16:creationId xmlns:a16="http://schemas.microsoft.com/office/drawing/2014/main" id="{72CDAAC3-3866-B2C7-8923-D598A8179034}"/>
               </a:ext>
             </a:extLst>
           </p:cNvPr>
@@ -1797,7 +1797,7 @@
           <p:cNvPr id="4" name="Content Placeholder 3">
             <a:extLst>
               <a:ext uri="{FF2B5EF4-FFF2-40B4-BE49-F238E27FC236}">
-                <a16:creationId xmlns:a16="http://schemas.microsoft.com/office/drawing/2014/main" id="{6586CDA1-F794-19BD-6E03-FB2396BBB0AF}"/>
+                <a16:creationId xmlns:a16="http://schemas.microsoft.com/office/drawing/2014/main" id="{2C0A42C7-ACAC-6211-5227-51FF61B01D2F}"/>
               </a:ext>
             </a:extLst>
           </p:cNvPr>
@@ -1859,7 +1859,7 @@
           <p:cNvPr id="5" name="Text Placeholder 4">
             <a:extLst>
               <a:ext uri="{FF2B5EF4-FFF2-40B4-BE49-F238E27FC236}">
-                <a16:creationId xmlns:a16="http://schemas.microsoft.com/office/drawing/2014/main" id="{A369B32C-41B6-DA2D-0CFD-E83454CDF844}"/>
+                <a16:creationId xmlns:a16="http://schemas.microsoft.com/office/drawing/2014/main" id="{4820F76F-62F9-E43E-C89A-316C85A8160A}"/>
               </a:ext>
             </a:extLst>
           </p:cNvPr>
@@ -1930,7 +1930,7 @@
           <p:cNvPr id="6" name="Content Placeholder 5">
             <a:extLst>
               <a:ext uri="{FF2B5EF4-FFF2-40B4-BE49-F238E27FC236}">
-                <a16:creationId xmlns:a16="http://schemas.microsoft.com/office/drawing/2014/main" id="{49D8909D-5473-12F2-5B65-A01843A686B4}"/>
+                <a16:creationId xmlns:a16="http://schemas.microsoft.com/office/drawing/2014/main" id="{32C68115-2199-C40A-2A9E-E0244C1D6B1C}"/>
               </a:ext>
             </a:extLst>
           </p:cNvPr>
@@ -1992,7 +1992,7 @@
           <p:cNvPr id="7" name="Date Placeholder 6">
             <a:extLst>
               <a:ext uri="{FF2B5EF4-FFF2-40B4-BE49-F238E27FC236}">
-                <a16:creationId xmlns:a16="http://schemas.microsoft.com/office/drawing/2014/main" id="{F62A3EBF-452C-AFA9-D8AB-86819CC2A60F}"/>
+                <a16:creationId xmlns:a16="http://schemas.microsoft.com/office/drawing/2014/main" id="{508ECEAD-43F8-1761-0B5C-F994F5F566B1}"/>
               </a:ext>
             </a:extLst>
           </p:cNvPr>
@@ -2008,9 +2008,9 @@
           <a:bodyPr/>
           <a:lstStyle/>
           <a:p>
-            <a:fld id="{775AB4AB-2B8E-4290-ADC8-49AA9E11DE56}" type="datetimeFigureOut">
+            <a:fld id="{451E388C-5248-41E8-9BD1-63C7D15982ED}" type="datetimeFigureOut">
               <a:rPr lang="en-US" smtClean="0"/>
-              <a:t>12/30/2025</a:t>
+              <a:t>12/31/2025</a:t>
             </a:fld>
             <a:endParaRPr lang="en-US"/>
           </a:p>
@@ -2021,7 +2021,7 @@
           <p:cNvPr id="8" name="Footer Placeholder 7">
             <a:extLst>
               <a:ext uri="{FF2B5EF4-FFF2-40B4-BE49-F238E27FC236}">
-                <a16:creationId xmlns:a16="http://schemas.microsoft.com/office/drawing/2014/main" id="{F9321126-1687-0CFA-0F6F-EB8BE9B4DA8F}"/>
+                <a16:creationId xmlns:a16="http://schemas.microsoft.com/office/drawing/2014/main" id="{89266A24-B028-DDDF-6522-C123781A84B5}"/>
               </a:ext>
             </a:extLst>
           </p:cNvPr>
@@ -2046,7 +2046,7 @@
           <p:cNvPr id="9" name="Slide Number Placeholder 8">
             <a:extLst>
               <a:ext uri="{FF2B5EF4-FFF2-40B4-BE49-F238E27FC236}">
-                <a16:creationId xmlns:a16="http://schemas.microsoft.com/office/drawing/2014/main" id="{B7F979AD-2A13-463C-4E90-D1DA3D920085}"/>
+                <a16:creationId xmlns:a16="http://schemas.microsoft.com/office/drawing/2014/main" id="{BDB9EC77-0844-7CC4-9DB8-B4EEECC729E9}"/>
               </a:ext>
             </a:extLst>
           </p:cNvPr>
@@ -2062,7 +2062,7 @@
           <a:bodyPr/>
           <a:lstStyle/>
           <a:p>
-            <a:fld id="{BAC9DC5F-1903-4277-8994-DA330A0CAB68}" type="slidenum">
+            <a:fld id="{BA2492E7-AE07-4FE0-B6B8-75C0494EB323}" type="slidenum">
               <a:rPr lang="en-US" smtClean="0"/>
               <a:t>‹#›</a:t>
             </a:fld>
@@ -2073,7 +2073,7 @@
     </p:spTree>
     <p:extLst>
       <p:ext uri="{BB962C8B-B14F-4D97-AF65-F5344CB8AC3E}">
-        <p14:creationId xmlns:p14="http://schemas.microsoft.com/office/powerpoint/2010/main" val="3111288972"/>
+        <p14:creationId xmlns:p14="http://schemas.microsoft.com/office/powerpoint/2010/main" val="4229977313"/>
       </p:ext>
     </p:extLst>
   </p:cSld>
@@ -2105,7 +2105,7 @@
           <p:cNvPr id="2" name="Title 1">
             <a:extLst>
               <a:ext uri="{FF2B5EF4-FFF2-40B4-BE49-F238E27FC236}">
-                <a16:creationId xmlns:a16="http://schemas.microsoft.com/office/drawing/2014/main" id="{252AE913-C9A6-0A0D-8C66-CEB23FECB38D}"/>
+                <a16:creationId xmlns:a16="http://schemas.microsoft.com/office/drawing/2014/main" id="{4B0E6C1B-FB5E-8313-AF80-CA53F1000E14}"/>
               </a:ext>
             </a:extLst>
           </p:cNvPr>
@@ -2133,7 +2133,7 @@
           <p:cNvPr id="3" name="Date Placeholder 2">
             <a:extLst>
               <a:ext uri="{FF2B5EF4-FFF2-40B4-BE49-F238E27FC236}">
-                <a16:creationId xmlns:a16="http://schemas.microsoft.com/office/drawing/2014/main" id="{A2A09F00-1176-B5DF-C47F-E8F46D0226FC}"/>
+                <a16:creationId xmlns:a16="http://schemas.microsoft.com/office/drawing/2014/main" id="{521DC77A-C823-5E26-6E75-3852A6EEA413}"/>
               </a:ext>
             </a:extLst>
           </p:cNvPr>
@@ -2149,9 +2149,9 @@
           <a:bodyPr/>
           <a:lstStyle/>
           <a:p>
-            <a:fld id="{775AB4AB-2B8E-4290-ADC8-49AA9E11DE56}" type="datetimeFigureOut">
+            <a:fld id="{451E388C-5248-41E8-9BD1-63C7D15982ED}" type="datetimeFigureOut">
               <a:rPr lang="en-US" smtClean="0"/>
-              <a:t>12/30/2025</a:t>
+              <a:t>12/31/2025</a:t>
             </a:fld>
             <a:endParaRPr lang="en-US"/>
           </a:p>
@@ -2162,7 +2162,7 @@
           <p:cNvPr id="4" name="Footer Placeholder 3">
             <a:extLst>
               <a:ext uri="{FF2B5EF4-FFF2-40B4-BE49-F238E27FC236}">
-                <a16:creationId xmlns:a16="http://schemas.microsoft.com/office/drawing/2014/main" id="{06757D24-5F94-78FB-59D8-42824AB5020A}"/>
+                <a16:creationId xmlns:a16="http://schemas.microsoft.com/office/drawing/2014/main" id="{D632A123-DA4F-971C-CFCB-CA233BAEDE83}"/>
               </a:ext>
             </a:extLst>
           </p:cNvPr>
@@ -2187,7 +2187,7 @@
           <p:cNvPr id="5" name="Slide Number Placeholder 4">
             <a:extLst>
               <a:ext uri="{FF2B5EF4-FFF2-40B4-BE49-F238E27FC236}">
-                <a16:creationId xmlns:a16="http://schemas.microsoft.com/office/drawing/2014/main" id="{C14CC15E-4BA3-AE99-8775-A646C897E92C}"/>
+                <a16:creationId xmlns:a16="http://schemas.microsoft.com/office/drawing/2014/main" id="{D47A429A-6975-7B2D-8F66-1E38643F5C61}"/>
               </a:ext>
             </a:extLst>
           </p:cNvPr>
@@ -2203,7 +2203,7 @@
           <a:bodyPr/>
           <a:lstStyle/>
           <a:p>
-            <a:fld id="{BAC9DC5F-1903-4277-8994-DA330A0CAB68}" type="slidenum">
+            <a:fld id="{BA2492E7-AE07-4FE0-B6B8-75C0494EB323}" type="slidenum">
               <a:rPr lang="en-US" smtClean="0"/>
               <a:t>‹#›</a:t>
             </a:fld>
@@ -2214,7 +2214,7 @@
     </p:spTree>
     <p:extLst>
       <p:ext uri="{BB962C8B-B14F-4D97-AF65-F5344CB8AC3E}">
-        <p14:creationId xmlns:p14="http://schemas.microsoft.com/office/powerpoint/2010/main" val="1867918615"/>
+        <p14:creationId xmlns:p14="http://schemas.microsoft.com/office/powerpoint/2010/main" val="652853966"/>
       </p:ext>
     </p:extLst>
   </p:cSld>
@@ -2246,7 +2246,7 @@
           <p:cNvPr id="2" name="Date Placeholder 1">
             <a:extLst>
               <a:ext uri="{FF2B5EF4-FFF2-40B4-BE49-F238E27FC236}">
-                <a16:creationId xmlns:a16="http://schemas.microsoft.com/office/drawing/2014/main" id="{D7A7EB48-BC19-6EB7-9175-A8096A1BAABE}"/>
+                <a16:creationId xmlns:a16="http://schemas.microsoft.com/office/drawing/2014/main" id="{70121A17-F768-5231-D18F-F27FEE7EFA21}"/>
               </a:ext>
             </a:extLst>
           </p:cNvPr>
@@ -2262,9 +2262,9 @@
           <a:bodyPr/>
           <a:lstStyle/>
           <a:p>
-            <a:fld id="{775AB4AB-2B8E-4290-ADC8-49AA9E11DE56}" type="datetimeFigureOut">
+            <a:fld id="{451E388C-5248-41E8-9BD1-63C7D15982ED}" type="datetimeFigureOut">
               <a:rPr lang="en-US" smtClean="0"/>
-              <a:t>12/30/2025</a:t>
+              <a:t>12/31/2025</a:t>
             </a:fld>
             <a:endParaRPr lang="en-US"/>
           </a:p>
@@ -2275,7 +2275,7 @@
           <p:cNvPr id="3" name="Footer Placeholder 2">
             <a:extLst>
               <a:ext uri="{FF2B5EF4-FFF2-40B4-BE49-F238E27FC236}">
-                <a16:creationId xmlns:a16="http://schemas.microsoft.com/office/drawing/2014/main" id="{5DF1706C-99C7-4A18-7F1B-75783962840C}"/>
+                <a16:creationId xmlns:a16="http://schemas.microsoft.com/office/drawing/2014/main" id="{180BD720-C1E1-0CD6-CCEF-0BBC56A7F758}"/>
               </a:ext>
             </a:extLst>
           </p:cNvPr>
@@ -2300,7 +2300,7 @@
           <p:cNvPr id="4" name="Slide Number Placeholder 3">
             <a:extLst>
               <a:ext uri="{FF2B5EF4-FFF2-40B4-BE49-F238E27FC236}">
-                <a16:creationId xmlns:a16="http://schemas.microsoft.com/office/drawing/2014/main" id="{BC8D79B4-4717-5825-0E89-25125FA62E91}"/>
+                <a16:creationId xmlns:a16="http://schemas.microsoft.com/office/drawing/2014/main" id="{CD37671B-C39A-C330-D81B-6B12CFA0FF6D}"/>
               </a:ext>
             </a:extLst>
           </p:cNvPr>
@@ -2316,7 +2316,7 @@
           <a:bodyPr/>
           <a:lstStyle/>
           <a:p>
-            <a:fld id="{BAC9DC5F-1903-4277-8994-DA330A0CAB68}" type="slidenum">
+            <a:fld id="{BA2492E7-AE07-4FE0-B6B8-75C0494EB323}" type="slidenum">
               <a:rPr lang="en-US" smtClean="0"/>
               <a:t>‹#›</a:t>
             </a:fld>
@@ -2327,7 +2327,7 @@
     </p:spTree>
     <p:extLst>
       <p:ext uri="{BB962C8B-B14F-4D97-AF65-F5344CB8AC3E}">
-        <p14:creationId xmlns:p14="http://schemas.microsoft.com/office/powerpoint/2010/main" val="1430655683"/>
+        <p14:creationId xmlns:p14="http://schemas.microsoft.com/office/powerpoint/2010/main" val="2776736290"/>
       </p:ext>
     </p:extLst>
   </p:cSld>
@@ -2359,7 +2359,7 @@
           <p:cNvPr id="2" name="Title 1">
             <a:extLst>
               <a:ext uri="{FF2B5EF4-FFF2-40B4-BE49-F238E27FC236}">
-                <a16:creationId xmlns:a16="http://schemas.microsoft.com/office/drawing/2014/main" id="{F4BB0999-BDFF-7F15-C157-C26F4B90E938}"/>
+                <a16:creationId xmlns:a16="http://schemas.microsoft.com/office/drawing/2014/main" id="{C37E0B2A-772A-4F3A-30F8-4228DA5D9AFA}"/>
               </a:ext>
             </a:extLst>
           </p:cNvPr>
@@ -2396,7 +2396,7 @@
           <p:cNvPr id="3" name="Content Placeholder 2">
             <a:extLst>
               <a:ext uri="{FF2B5EF4-FFF2-40B4-BE49-F238E27FC236}">
-                <a16:creationId xmlns:a16="http://schemas.microsoft.com/office/drawing/2014/main" id="{DA71D1C6-95B8-F1DA-C7C9-51FB2252E8D6}"/>
+                <a16:creationId xmlns:a16="http://schemas.microsoft.com/office/drawing/2014/main" id="{F7D25AA1-5AF5-8ADA-EB52-89069751C85A}"/>
               </a:ext>
             </a:extLst>
           </p:cNvPr>
@@ -2486,7 +2486,7 @@
           <p:cNvPr id="4" name="Text Placeholder 3">
             <a:extLst>
               <a:ext uri="{FF2B5EF4-FFF2-40B4-BE49-F238E27FC236}">
-                <a16:creationId xmlns:a16="http://schemas.microsoft.com/office/drawing/2014/main" id="{2BF2994E-1D23-FE81-4369-C31EA12B309E}"/>
+                <a16:creationId xmlns:a16="http://schemas.microsoft.com/office/drawing/2014/main" id="{129977B1-6145-458D-511B-1C6C0B1B3D0F}"/>
               </a:ext>
             </a:extLst>
           </p:cNvPr>
@@ -2557,7 +2557,7 @@
           <p:cNvPr id="5" name="Date Placeholder 4">
             <a:extLst>
               <a:ext uri="{FF2B5EF4-FFF2-40B4-BE49-F238E27FC236}">
-                <a16:creationId xmlns:a16="http://schemas.microsoft.com/office/drawing/2014/main" id="{B376720E-AF67-5C1E-442A-F4549FBBE303}"/>
+                <a16:creationId xmlns:a16="http://schemas.microsoft.com/office/drawing/2014/main" id="{0212072F-6C0E-68CA-A197-3BD7AED066A5}"/>
               </a:ext>
             </a:extLst>
           </p:cNvPr>
@@ -2573,9 +2573,9 @@
           <a:bodyPr/>
           <a:lstStyle/>
           <a:p>
-            <a:fld id="{775AB4AB-2B8E-4290-ADC8-49AA9E11DE56}" type="datetimeFigureOut">
+            <a:fld id="{451E388C-5248-41E8-9BD1-63C7D15982ED}" type="datetimeFigureOut">
               <a:rPr lang="en-US" smtClean="0"/>
-              <a:t>12/30/2025</a:t>
+              <a:t>12/31/2025</a:t>
             </a:fld>
             <a:endParaRPr lang="en-US"/>
           </a:p>
@@ -2586,7 +2586,7 @@
           <p:cNvPr id="6" name="Footer Placeholder 5">
             <a:extLst>
               <a:ext uri="{FF2B5EF4-FFF2-40B4-BE49-F238E27FC236}">
-                <a16:creationId xmlns:a16="http://schemas.microsoft.com/office/drawing/2014/main" id="{B76A5E6B-C2A5-6DF4-075F-ACAA095A47EB}"/>
+                <a16:creationId xmlns:a16="http://schemas.microsoft.com/office/drawing/2014/main" id="{7FABCCDD-EDF4-A7EF-37F8-BA18E908FA55}"/>
               </a:ext>
             </a:extLst>
           </p:cNvPr>
@@ -2611,7 +2611,7 @@
           <p:cNvPr id="7" name="Slide Number Placeholder 6">
             <a:extLst>
               <a:ext uri="{FF2B5EF4-FFF2-40B4-BE49-F238E27FC236}">
-                <a16:creationId xmlns:a16="http://schemas.microsoft.com/office/drawing/2014/main" id="{96987E51-61F7-D0FD-4C50-DAC6F89935E2}"/>
+                <a16:creationId xmlns:a16="http://schemas.microsoft.com/office/drawing/2014/main" id="{218B953E-E779-18F2-BC9C-F9ABB1D01B5F}"/>
               </a:ext>
             </a:extLst>
           </p:cNvPr>
@@ -2627,7 +2627,7 @@
           <a:bodyPr/>
           <a:lstStyle/>
           <a:p>
-            <a:fld id="{BAC9DC5F-1903-4277-8994-DA330A0CAB68}" type="slidenum">
+            <a:fld id="{BA2492E7-AE07-4FE0-B6B8-75C0494EB323}" type="slidenum">
               <a:rPr lang="en-US" smtClean="0"/>
               <a:t>‹#›</a:t>
             </a:fld>
@@ -2638,7 +2638,7 @@
     </p:spTree>
     <p:extLst>
       <p:ext uri="{BB962C8B-B14F-4D97-AF65-F5344CB8AC3E}">
-        <p14:creationId xmlns:p14="http://schemas.microsoft.com/office/powerpoint/2010/main" val="1309604621"/>
+        <p14:creationId xmlns:p14="http://schemas.microsoft.com/office/powerpoint/2010/main" val="1755317711"/>
       </p:ext>
     </p:extLst>
   </p:cSld>
@@ -2670,7 +2670,7 @@
           <p:cNvPr id="2" name="Title 1">
             <a:extLst>
               <a:ext uri="{FF2B5EF4-FFF2-40B4-BE49-F238E27FC236}">
-                <a16:creationId xmlns:a16="http://schemas.microsoft.com/office/drawing/2014/main" id="{AB8DF580-5D27-F754-9CA7-C60A3F4D7ECF}"/>
+                <a16:creationId xmlns:a16="http://schemas.microsoft.com/office/drawing/2014/main" id="{99998669-97F7-22F0-1249-5941436F9583}"/>
               </a:ext>
             </a:extLst>
           </p:cNvPr>
@@ -2707,7 +2707,7 @@
           <p:cNvPr id="3" name="Picture Placeholder 2">
             <a:extLst>
               <a:ext uri="{FF2B5EF4-FFF2-40B4-BE49-F238E27FC236}">
-                <a16:creationId xmlns:a16="http://schemas.microsoft.com/office/drawing/2014/main" id="{3674C7FF-2B81-200E-77B6-7C402C271AD8}"/>
+                <a16:creationId xmlns:a16="http://schemas.microsoft.com/office/drawing/2014/main" id="{89DCA546-6EE8-0E99-7A3D-5EF039821ED1}"/>
               </a:ext>
             </a:extLst>
           </p:cNvPr>
@@ -2774,7 +2774,7 @@
           <p:cNvPr id="4" name="Text Placeholder 3">
             <a:extLst>
               <a:ext uri="{FF2B5EF4-FFF2-40B4-BE49-F238E27FC236}">
-                <a16:creationId xmlns:a16="http://schemas.microsoft.com/office/drawing/2014/main" id="{6CFD017F-0561-2B7A-FF83-5755359464E3}"/>
+                <a16:creationId xmlns:a16="http://schemas.microsoft.com/office/drawing/2014/main" id="{F8E57754-48E4-DFB7-67FF-85A36FFEBC35}"/>
               </a:ext>
             </a:extLst>
           </p:cNvPr>
@@ -2845,7 +2845,7 @@
           <p:cNvPr id="5" name="Date Placeholder 4">
             <a:extLst>
               <a:ext uri="{FF2B5EF4-FFF2-40B4-BE49-F238E27FC236}">
-                <a16:creationId xmlns:a16="http://schemas.microsoft.com/office/drawing/2014/main" id="{237A7A58-4836-C851-1852-2A272B815476}"/>
+                <a16:creationId xmlns:a16="http://schemas.microsoft.com/office/drawing/2014/main" id="{EA0DBF6E-F89E-F362-CFBF-B55A9BAC8D74}"/>
               </a:ext>
             </a:extLst>
           </p:cNvPr>
@@ -2861,9 +2861,9 @@
           <a:bodyPr/>
           <a:lstStyle/>
           <a:p>
-            <a:fld id="{775AB4AB-2B8E-4290-ADC8-49AA9E11DE56}" type="datetimeFigureOut">
+            <a:fld id="{451E388C-5248-41E8-9BD1-63C7D15982ED}" type="datetimeFigureOut">
               <a:rPr lang="en-US" smtClean="0"/>
-              <a:t>12/30/2025</a:t>
+              <a:t>12/31/2025</a:t>
             </a:fld>
             <a:endParaRPr lang="en-US"/>
           </a:p>
@@ -2874,7 +2874,7 @@
           <p:cNvPr id="6" name="Footer Placeholder 5">
             <a:extLst>
               <a:ext uri="{FF2B5EF4-FFF2-40B4-BE49-F238E27FC236}">
-                <a16:creationId xmlns:a16="http://schemas.microsoft.com/office/drawing/2014/main" id="{FCD03E7A-5801-81DA-FC7D-FF701430F286}"/>
+                <a16:creationId xmlns:a16="http://schemas.microsoft.com/office/drawing/2014/main" id="{DF77642D-58F0-6DE0-0E0F-3E17C5C1B32E}"/>
               </a:ext>
             </a:extLst>
           </p:cNvPr>
@@ -2899,7 +2899,7 @@
           <p:cNvPr id="7" name="Slide Number Placeholder 6">
             <a:extLst>
               <a:ext uri="{FF2B5EF4-FFF2-40B4-BE49-F238E27FC236}">
-                <a16:creationId xmlns:a16="http://schemas.microsoft.com/office/drawing/2014/main" id="{13D38040-DC9A-906F-5C81-27821E537E9E}"/>
+                <a16:creationId xmlns:a16="http://schemas.microsoft.com/office/drawing/2014/main" id="{20A1C03A-7BFD-8060-63D1-2838B01E6807}"/>
               </a:ext>
             </a:extLst>
           </p:cNvPr>
@@ -2915,7 +2915,7 @@
           <a:bodyPr/>
           <a:lstStyle/>
           <a:p>
-            <a:fld id="{BAC9DC5F-1903-4277-8994-DA330A0CAB68}" type="slidenum">
+            <a:fld id="{BA2492E7-AE07-4FE0-B6B8-75C0494EB323}" type="slidenum">
               <a:rPr lang="en-US" smtClean="0"/>
               <a:t>‹#›</a:t>
             </a:fld>
@@ -2926,7 +2926,7 @@
     </p:spTree>
     <p:extLst>
       <p:ext uri="{BB962C8B-B14F-4D97-AF65-F5344CB8AC3E}">
-        <p14:creationId xmlns:p14="http://schemas.microsoft.com/office/powerpoint/2010/main" val="3089190681"/>
+        <p14:creationId xmlns:p14="http://schemas.microsoft.com/office/powerpoint/2010/main" val="605720884"/>
       </p:ext>
     </p:extLst>
   </p:cSld>
@@ -2963,7 +2963,7 @@
           <p:cNvPr id="2" name="Title Placeholder 1">
             <a:extLst>
               <a:ext uri="{FF2B5EF4-FFF2-40B4-BE49-F238E27FC236}">
-                <a16:creationId xmlns:a16="http://schemas.microsoft.com/office/drawing/2014/main" id="{CA06C126-38A3-0D55-61EE-E8B248749A30}"/>
+                <a16:creationId xmlns:a16="http://schemas.microsoft.com/office/drawing/2014/main" id="{3945143B-7BC4-FA49-58B0-5212FEBC3491}"/>
               </a:ext>
             </a:extLst>
           </p:cNvPr>
@@ -3001,7 +3001,7 @@
           <p:cNvPr id="3" name="Text Placeholder 2">
             <a:extLst>
               <a:ext uri="{FF2B5EF4-FFF2-40B4-BE49-F238E27FC236}">
-                <a16:creationId xmlns:a16="http://schemas.microsoft.com/office/drawing/2014/main" id="{2849D900-1E55-3A36-CC1A-8F204919BE1C}"/>
+                <a16:creationId xmlns:a16="http://schemas.microsoft.com/office/drawing/2014/main" id="{0A93196F-A612-C84F-256A-424AA4079A46}"/>
               </a:ext>
             </a:extLst>
           </p:cNvPr>
@@ -3068,7 +3068,7 @@
           <p:cNvPr id="4" name="Date Placeholder 3">
             <a:extLst>
               <a:ext uri="{FF2B5EF4-FFF2-40B4-BE49-F238E27FC236}">
-                <a16:creationId xmlns:a16="http://schemas.microsoft.com/office/drawing/2014/main" id="{FD724102-6842-75CB-0F3A-57AC6DA8A003}"/>
+                <a16:creationId xmlns:a16="http://schemas.microsoft.com/office/drawing/2014/main" id="{BAEDA1BE-E1DD-CBD6-09C2-F3C1D835C4BF}"/>
               </a:ext>
             </a:extLst>
           </p:cNvPr>
@@ -3102,9 +3102,9 @@
             </a:lvl1pPr>
           </a:lstStyle>
           <a:p>
-            <a:fld id="{775AB4AB-2B8E-4290-ADC8-49AA9E11DE56}" type="datetimeFigureOut">
+            <a:fld id="{451E388C-5248-41E8-9BD1-63C7D15982ED}" type="datetimeFigureOut">
               <a:rPr lang="en-US" smtClean="0"/>
-              <a:t>12/30/2025</a:t>
+              <a:t>12/31/2025</a:t>
             </a:fld>
             <a:endParaRPr lang="en-US"/>
           </a:p>
@@ -3115,7 +3115,7 @@
           <p:cNvPr id="5" name="Footer Placeholder 4">
             <a:extLst>
               <a:ext uri="{FF2B5EF4-FFF2-40B4-BE49-F238E27FC236}">
-                <a16:creationId xmlns:a16="http://schemas.microsoft.com/office/drawing/2014/main" id="{A043EBBE-E6F5-47C5-2459-AA4FA9F012F5}"/>
+                <a16:creationId xmlns:a16="http://schemas.microsoft.com/office/drawing/2014/main" id="{921A914E-DFCD-05C1-1F38-C28C0EA0BA98}"/>
               </a:ext>
             </a:extLst>
           </p:cNvPr>
@@ -3158,7 +3158,7 @@
           <p:cNvPr id="6" name="Slide Number Placeholder 5">
             <a:extLst>
               <a:ext uri="{FF2B5EF4-FFF2-40B4-BE49-F238E27FC236}">
-                <a16:creationId xmlns:a16="http://schemas.microsoft.com/office/drawing/2014/main" id="{B66F68CF-76C0-38BC-56E7-40BE607C3B6C}"/>
+                <a16:creationId xmlns:a16="http://schemas.microsoft.com/office/drawing/2014/main" id="{6963CEDB-8454-E700-93B6-4654BED9C026}"/>
               </a:ext>
             </a:extLst>
           </p:cNvPr>
@@ -3192,7 +3192,7 @@
             </a:lvl1pPr>
           </a:lstStyle>
           <a:p>
-            <a:fld id="{BAC9DC5F-1903-4277-8994-DA330A0CAB68}" type="slidenum">
+            <a:fld id="{BA2492E7-AE07-4FE0-B6B8-75C0494EB323}" type="slidenum">
               <a:rPr lang="en-US" smtClean="0"/>
               <a:t>‹#›</a:t>
             </a:fld>
@@ -3203,7 +3203,7 @@
     </p:spTree>
     <p:extLst>
       <p:ext uri="{BB962C8B-B14F-4D97-AF65-F5344CB8AC3E}">
-        <p14:creationId xmlns:p14="http://schemas.microsoft.com/office/powerpoint/2010/main" val="1907622612"/>
+        <p14:creationId xmlns:p14="http://schemas.microsoft.com/office/powerpoint/2010/main" val="617973461"/>
       </p:ext>
     </p:extLst>
   </p:cSld>
@@ -3527,7 +3527,7 @@
           <p:cNvPr id="2" name="Title 1">
             <a:extLst>
               <a:ext uri="{FF2B5EF4-FFF2-40B4-BE49-F238E27FC236}">
-                <a16:creationId xmlns:a16="http://schemas.microsoft.com/office/drawing/2014/main" id="{1D6BD9E9-9AA6-6155-7EB8-AB4B3752F95A}"/>
+                <a16:creationId xmlns:a16="http://schemas.microsoft.com/office/drawing/2014/main" id="{D4672B6F-687E-BDD7-E3B9-D67D150240D9}"/>
               </a:ext>
             </a:extLst>
           </p:cNvPr>
@@ -3555,7 +3555,7 @@
           <p:cNvPr id="3" name="Subtitle 2">
             <a:extLst>
               <a:ext uri="{FF2B5EF4-FFF2-40B4-BE49-F238E27FC236}">
-                <a16:creationId xmlns:a16="http://schemas.microsoft.com/office/drawing/2014/main" id="{D501CAB2-9F88-5246-E641-96779CAC9BCE}"/>
+                <a16:creationId xmlns:a16="http://schemas.microsoft.com/office/drawing/2014/main" id="{756D5187-C793-DAEE-81E3-303F6F424EE8}"/>
               </a:ext>
             </a:extLst>
           </p:cNvPr>
@@ -3581,7 +3581,7 @@
     </p:spTree>
     <p:extLst>
       <p:ext uri="{BB962C8B-B14F-4D97-AF65-F5344CB8AC3E}">
-        <p14:creationId xmlns:p14="http://schemas.microsoft.com/office/powerpoint/2010/main" val="711020138"/>
+        <p14:creationId xmlns:p14="http://schemas.microsoft.com/office/powerpoint/2010/main" val="3476792910"/>
       </p:ext>
     </p:extLst>
   </p:cSld>
@@ -3613,7 +3613,7 @@
           <p:cNvPr id="2" name="Title 1">
             <a:extLst>
               <a:ext uri="{FF2B5EF4-FFF2-40B4-BE49-F238E27FC236}">
-                <a16:creationId xmlns:a16="http://schemas.microsoft.com/office/drawing/2014/main" id="{FACE2689-E0F3-115D-41E1-D43D4E7EFC46}"/>
+                <a16:creationId xmlns:a16="http://schemas.microsoft.com/office/drawing/2014/main" id="{C7DBC387-8757-12D7-7AA4-8D9F74760293}"/>
               </a:ext>
             </a:extLst>
           </p:cNvPr>
@@ -3641,7 +3641,7 @@
           <p:cNvPr id="3" name="Text Placeholder 2">
             <a:extLst>
               <a:ext uri="{FF2B5EF4-FFF2-40B4-BE49-F238E27FC236}">
-                <a16:creationId xmlns:a16="http://schemas.microsoft.com/office/drawing/2014/main" id="{A320CC45-3C30-8C05-75AE-B75FF98B2D81}"/>
+                <a16:creationId xmlns:a16="http://schemas.microsoft.com/office/drawing/2014/main" id="{A953CBBC-BAF7-ABEC-5FEE-D39C1C7B06BA}"/>
               </a:ext>
             </a:extLst>
           </p:cNvPr>
@@ -3671,7 +3671,7 @@
     </p:spTree>
     <p:extLst>
       <p:ext uri="{BB962C8B-B14F-4D97-AF65-F5344CB8AC3E}">
-        <p14:creationId xmlns:p14="http://schemas.microsoft.com/office/powerpoint/2010/main" val="1069794642"/>
+        <p14:creationId xmlns:p14="http://schemas.microsoft.com/office/powerpoint/2010/main" val="4162860858"/>
       </p:ext>
     </p:extLst>
   </p:cSld>
@@ -3703,7 +3703,7 @@
           <p:cNvPr id="2" name="Title 1">
             <a:extLst>
               <a:ext uri="{FF2B5EF4-FFF2-40B4-BE49-F238E27FC236}">
-                <a16:creationId xmlns:a16="http://schemas.microsoft.com/office/drawing/2014/main" id="{65984B6D-4C40-7376-CDF4-45D7DB3DE6F3}"/>
+                <a16:creationId xmlns:a16="http://schemas.microsoft.com/office/drawing/2014/main" id="{988F34DF-2DCA-C741-408F-A76DD2812C27}"/>
               </a:ext>
             </a:extLst>
           </p:cNvPr>
@@ -3731,7 +3731,7 @@
           <p:cNvPr id="3" name="Text Placeholder 2">
             <a:extLst>
               <a:ext uri="{FF2B5EF4-FFF2-40B4-BE49-F238E27FC236}">
-                <a16:creationId xmlns:a16="http://schemas.microsoft.com/office/drawing/2014/main" id="{3C9496D2-488F-0DE6-80A4-EE8FA8D4E360}"/>
+                <a16:creationId xmlns:a16="http://schemas.microsoft.com/office/drawing/2014/main" id="{8ED00EED-9CF8-01FE-6C37-3A4730F6DA34}"/>
               </a:ext>
             </a:extLst>
           </p:cNvPr>
@@ -3761,7 +3761,7 @@
     </p:spTree>
     <p:extLst>
       <p:ext uri="{BB962C8B-B14F-4D97-AF65-F5344CB8AC3E}">
-        <p14:creationId xmlns:p14="http://schemas.microsoft.com/office/powerpoint/2010/main" val="4102497066"/>
+        <p14:creationId xmlns:p14="http://schemas.microsoft.com/office/powerpoint/2010/main" val="2692453395"/>
       </p:ext>
     </p:extLst>
   </p:cSld>

</xml_diff>